<commit_message>
Link + exercise 001.
</commit_message>
<xml_diff>
--- a/Web Development.pptx
+++ b/Web Development.pptx
@@ -10,6 +10,7 @@
     <p:sldId id="258" r:id="rId4"/>
     <p:sldId id="259" r:id="rId5"/>
     <p:sldId id="260" r:id="rId6"/>
+    <p:sldId id="261" r:id="rId7"/>
   </p:sldIdLst>
   <p:sldSz cx="12192000" cy="6858000"/>
   <p:notesSz cx="6858000" cy="9144000"/>
@@ -108,6 +109,11 @@
       </a:defRPr>
     </a:lvl9pPr>
   </p:defaultTextStyle>
+  <p:extLst>
+    <p:ext uri="{EFAFB233-063F-42B5-8137-9DF3F51BA10A}">
+      <p15:sldGuideLst xmlns:p15="http://schemas.microsoft.com/office/powerpoint/2012/main"/>
+    </p:ext>
+  </p:extLst>
 </p:presentation>
 </file>
 
@@ -4048,6 +4054,265 @@
     <p:extLst>
       <p:ext uri="{BB962C8B-B14F-4D97-AF65-F5344CB8AC3E}">
         <p14:creationId xmlns:p14="http://schemas.microsoft.com/office/powerpoint/2010/main" val="372065096"/>
+      </p:ext>
+    </p:extLst>
+  </p:cSld>
+  <p:clrMapOvr>
+    <a:masterClrMapping/>
+  </p:clrMapOvr>
+</p:sld>
+</file>
+
+<file path=ppt/slides/slide6.xml><?xml version="1.0" encoding="utf-8"?>
+<p:sld xmlns:a="http://schemas.openxmlformats.org/drawingml/2006/main" xmlns:r="http://schemas.openxmlformats.org/officeDocument/2006/relationships" xmlns:p="http://schemas.openxmlformats.org/presentationml/2006/main">
+  <p:cSld>
+    <p:spTree>
+      <p:nvGrpSpPr>
+        <p:cNvPr id="1" name=""/>
+        <p:cNvGrpSpPr/>
+        <p:nvPr/>
+      </p:nvGrpSpPr>
+      <p:grpSpPr>
+        <a:xfrm>
+          <a:off x="0" y="0"/>
+          <a:ext cx="0" cy="0"/>
+          <a:chOff x="0" y="0"/>
+          <a:chExt cx="0" cy="0"/>
+        </a:xfrm>
+      </p:grpSpPr>
+      <p:sp>
+        <p:nvSpPr>
+          <p:cNvPr id="2" name="Title 1">
+            <a:extLst>
+              <a:ext uri="{FF2B5EF4-FFF2-40B4-BE49-F238E27FC236}">
+                <a16:creationId xmlns:a16="http://schemas.microsoft.com/office/drawing/2014/main" id="{1B9D1E46-61C1-F317-0628-09F46E53FC2E}"/>
+              </a:ext>
+            </a:extLst>
+          </p:cNvPr>
+          <p:cNvSpPr>
+            <a:spLocks noGrp="1"/>
+          </p:cNvSpPr>
+          <p:nvPr>
+            <p:ph type="title"/>
+          </p:nvPr>
+        </p:nvSpPr>
+        <p:spPr/>
+        <p:txBody>
+          <a:bodyPr/>
+          <a:lstStyle/>
+          <a:p>
+            <a:r>
+              <a:rPr lang="en-US" dirty="0"/>
+              <a:t>Exercise 001</a:t>
+            </a:r>
+          </a:p>
+        </p:txBody>
+      </p:sp>
+      <p:pic>
+        <p:nvPicPr>
+          <p:cNvPr id="5" name="Content Placeholder 4" descr="A close-up of a note&#10;&#10;Description automatically generated">
+            <a:extLst>
+              <a:ext uri="{FF2B5EF4-FFF2-40B4-BE49-F238E27FC236}">
+                <a16:creationId xmlns:a16="http://schemas.microsoft.com/office/drawing/2014/main" id="{4C67EAB5-D011-754A-1136-B4B91EEB0893}"/>
+              </a:ext>
+            </a:extLst>
+          </p:cNvPr>
+          <p:cNvPicPr>
+            <a:picLocks noGrp="1" noChangeAspect="1"/>
+          </p:cNvPicPr>
+          <p:nvPr>
+            <p:ph idx="1"/>
+          </p:nvPr>
+        </p:nvPicPr>
+        <p:blipFill>
+          <a:blip r:embed="rId2"/>
+          <a:stretch>
+            <a:fillRect/>
+          </a:stretch>
+        </p:blipFill>
+        <p:spPr>
+          <a:xfrm>
+            <a:off x="6509951" y="1517650"/>
+            <a:ext cx="5029200" cy="3822700"/>
+          </a:xfrm>
+        </p:spPr>
+      </p:pic>
+      <p:sp>
+        <p:nvSpPr>
+          <p:cNvPr id="6" name="TextBox 5">
+            <a:extLst>
+              <a:ext uri="{FF2B5EF4-FFF2-40B4-BE49-F238E27FC236}">
+                <a16:creationId xmlns:a16="http://schemas.microsoft.com/office/drawing/2014/main" id="{6CF00E4A-B677-D550-3B6C-C7078BEFF1BC}"/>
+              </a:ext>
+            </a:extLst>
+          </p:cNvPr>
+          <p:cNvSpPr txBox="1"/>
+          <p:nvPr/>
+        </p:nvSpPr>
+        <p:spPr>
+          <a:xfrm>
+            <a:off x="838200" y="4740185"/>
+            <a:ext cx="5907002" cy="2031325"/>
+          </a:xfrm>
+          <a:prstGeom prst="rect">
+            <a:avLst/>
+          </a:prstGeom>
+          <a:noFill/>
+        </p:spPr>
+        <p:txBody>
+          <a:bodyPr wrap="none" rtlCol="0">
+            <a:spAutoFit/>
+          </a:bodyPr>
+          <a:lstStyle/>
+          <a:p>
+            <a:r>
+              <a:rPr lang="en-US" dirty="0"/>
+              <a:t>Learning resources</a:t>
+            </a:r>
+          </a:p>
+          <a:p>
+            <a:pPr marL="285750" indent="-285750">
+              <a:buFont typeface="Arial" panose="020B0604020202020204" pitchFamily="34" charset="0"/>
+              <a:buChar char="•"/>
+            </a:pPr>
+            <a:r>
+              <a:rPr lang="en-US" dirty="0">
+                <a:hlinkClick r:id="rId3"/>
+              </a:rPr>
+              <a:t>https://www.w3schools.com/html/html_intro.asp</a:t>
+            </a:r>
+            <a:endParaRPr lang="en-US" dirty="0"/>
+          </a:p>
+          <a:p>
+            <a:pPr marL="285750" indent="-285750">
+              <a:buFont typeface="Arial" panose="020B0604020202020204" pitchFamily="34" charset="0"/>
+              <a:buChar char="•"/>
+            </a:pPr>
+            <a:r>
+              <a:rPr lang="en-US" dirty="0">
+                <a:hlinkClick r:id="rId4"/>
+              </a:rPr>
+              <a:t>https://www.w3schools.com/html/html_basic.asp</a:t>
+            </a:r>
+            <a:endParaRPr lang="en-US" dirty="0"/>
+          </a:p>
+          <a:p>
+            <a:pPr marL="285750" indent="-285750">
+              <a:buFont typeface="Arial" panose="020B0604020202020204" pitchFamily="34" charset="0"/>
+              <a:buChar char="•"/>
+            </a:pPr>
+            <a:r>
+              <a:rPr lang="en-US" dirty="0">
+                <a:hlinkClick r:id="rId5"/>
+              </a:rPr>
+              <a:t>https://www.w3schools.com/html/html_elements.asp</a:t>
+            </a:r>
+            <a:endParaRPr lang="en-US" dirty="0"/>
+          </a:p>
+          <a:p>
+            <a:pPr marL="285750" indent="-285750">
+              <a:buFont typeface="Arial" panose="020B0604020202020204" pitchFamily="34" charset="0"/>
+              <a:buChar char="•"/>
+            </a:pPr>
+            <a:r>
+              <a:rPr lang="en-US" dirty="0">
+                <a:hlinkClick r:id="rId6"/>
+              </a:rPr>
+              <a:t>https://www.w3schools.com/html/html_attributes.asp</a:t>
+            </a:r>
+            <a:endParaRPr lang="en-US" dirty="0"/>
+          </a:p>
+          <a:p>
+            <a:pPr marL="285750" indent="-285750">
+              <a:buFont typeface="Arial" panose="020B0604020202020204" pitchFamily="34" charset="0"/>
+              <a:buChar char="•"/>
+            </a:pPr>
+            <a:r>
+              <a:rPr lang="en-US" dirty="0">
+                <a:hlinkClick r:id="rId7"/>
+              </a:rPr>
+              <a:t>https://www.w3schools.com/html/html_tables.asp</a:t>
+            </a:r>
+            <a:r>
+              <a:rPr lang="en-US" dirty="0"/>
+              <a:t> </a:t>
+            </a:r>
+          </a:p>
+          <a:p>
+            <a:endParaRPr lang="en-US" dirty="0"/>
+          </a:p>
+        </p:txBody>
+      </p:sp>
+      <p:sp>
+        <p:nvSpPr>
+          <p:cNvPr id="7" name="TextBox 6">
+            <a:extLst>
+              <a:ext uri="{FF2B5EF4-FFF2-40B4-BE49-F238E27FC236}">
+                <a16:creationId xmlns:a16="http://schemas.microsoft.com/office/drawing/2014/main" id="{8C91E02B-2C48-63B3-5AEE-9A707736987E}"/>
+              </a:ext>
+            </a:extLst>
+          </p:cNvPr>
+          <p:cNvSpPr txBox="1"/>
+          <p:nvPr/>
+        </p:nvSpPr>
+        <p:spPr>
+          <a:xfrm>
+            <a:off x="838200" y="1690688"/>
+            <a:ext cx="5029200" cy="1477328"/>
+          </a:xfrm>
+          <a:prstGeom prst="rect">
+            <a:avLst/>
+          </a:prstGeom>
+          <a:noFill/>
+        </p:spPr>
+        <p:txBody>
+          <a:bodyPr wrap="square" rtlCol="0">
+            <a:spAutoFit/>
+          </a:bodyPr>
+          <a:lstStyle/>
+          <a:p>
+            <a:r>
+              <a:rPr lang="en-US" dirty="0"/>
+              <a:t>Modify the file </a:t>
+            </a:r>
+            <a:r>
+              <a:rPr lang="en-US" b="1" dirty="0" err="1"/>
+              <a:t>index.html</a:t>
+            </a:r>
+            <a:r>
+              <a:rPr lang="en-US" dirty="0"/>
+              <a:t>:</a:t>
+            </a:r>
+          </a:p>
+          <a:p>
+            <a:r>
+              <a:rPr lang="en-US" dirty="0"/>
+              <a:t>- add a table with two columns and 3 rows</a:t>
+            </a:r>
+          </a:p>
+          <a:p>
+            <a:r>
+              <a:rPr lang="en-US" dirty="0"/>
+              <a:t>- make the column headings </a:t>
+            </a:r>
+            <a:r>
+              <a:rPr lang="en-US" b="1" dirty="0"/>
+              <a:t>bold</a:t>
+            </a:r>
+            <a:endParaRPr lang="en-US" dirty="0"/>
+          </a:p>
+          <a:p>
+            <a:endParaRPr lang="en-US" dirty="0"/>
+          </a:p>
+          <a:p>
+            <a:endParaRPr lang="en-US" dirty="0"/>
+          </a:p>
+        </p:txBody>
+      </p:sp>
+    </p:spTree>
+    <p:extLst>
+      <p:ext uri="{BB962C8B-B14F-4D97-AF65-F5344CB8AC3E}">
+        <p14:creationId xmlns:p14="http://schemas.microsoft.com/office/powerpoint/2010/main" val="9945172"/>
       </p:ext>
     </p:extLst>
   </p:cSld>

</xml_diff>